<commit_message>
poster and abstract updates
</commit_message>
<xml_diff>
--- a/SDDPoster.pptx
+++ b/SDDPoster.pptx
@@ -14,14 +14,14 @@
   <p:notesSz cx="9094788" cy="13573125"/>
   <p:embeddedFontLst>
     <p:embeddedFont>
-      <p:font typeface="Gill Sans MT" panose="020B0502020104020203" pitchFamily="34" charset="0"/>
+      <p:font typeface="Calibri" panose="020F0502020204030204" pitchFamily="34" charset="0"/>
       <p:regular r:id="rId4"/>
       <p:bold r:id="rId5"/>
       <p:italic r:id="rId6"/>
       <p:boldItalic r:id="rId7"/>
     </p:embeddedFont>
     <p:embeddedFont>
-      <p:font typeface="Calibri" panose="020F0502020204030204" pitchFamily="34" charset="0"/>
+      <p:font typeface="Gill Sans MT" panose="020B0502020104020203" pitchFamily="34" charset="0"/>
       <p:regular r:id="rId8"/>
       <p:bold r:id="rId9"/>
       <p:italic r:id="rId10"/>
@@ -4250,47 +4250,6 @@
           </a:extLst>
         </p:spPr>
       </p:pic>
-      <p:pic>
-        <p:nvPicPr>
-          <p:cNvPr id="1027" name="Picture 3" descr="C:\Users\Gordon\Desktop\InertialMotion.png"/>
-          <p:cNvPicPr>
-            <a:picLocks noChangeAspect="1" noChangeArrowheads="1"/>
-          </p:cNvPicPr>
-          <p:nvPr/>
-        </p:nvPicPr>
-        <p:blipFill>
-          <a:blip r:embed="rId4">
-            <a:extLst>
-              <a:ext uri="{28A0092B-C50C-407E-A947-70E740481C1C}">
-                <a14:useLocalDpi xmlns:a14="http://schemas.microsoft.com/office/drawing/2010/main" val="0"/>
-              </a:ext>
-            </a:extLst>
-          </a:blip>
-          <a:srcRect/>
-          <a:stretch>
-            <a:fillRect/>
-          </a:stretch>
-        </p:blipFill>
-        <p:spPr bwMode="auto">
-          <a:xfrm>
-            <a:off x="13359429" y="25159876"/>
-            <a:ext cx="9803551" cy="7342632"/>
-          </a:xfrm>
-          <a:prstGeom prst="rect">
-            <a:avLst/>
-          </a:prstGeom>
-          <a:noFill/>
-          <a:extLst>
-            <a:ext uri="{909E8E84-426E-40DD-AFC4-6F175D3DCCD1}">
-              <a14:hiddenFill xmlns:a14="http://schemas.microsoft.com/office/drawing/2010/main">
-                <a:solidFill>
-                  <a:srgbClr val="FFFFFF"/>
-                </a:solidFill>
-              </a14:hiddenFill>
-            </a:ext>
-          </a:extLst>
-        </p:spPr>
-      </p:pic>
       <p:sp>
         <p:nvSpPr>
           <p:cNvPr id="33" name="Rectangle 32"/>
@@ -4512,7 +4471,7 @@
         <p:spPr bwMode="auto">
           <a:xfrm>
             <a:off x="152400" y="0"/>
-            <a:ext cx="24003000" cy="4016484"/>
+            <a:ext cx="24003000" cy="4632037"/>
           </a:xfrm>
           <a:prstGeom prst="rect">
             <a:avLst/>
@@ -4722,10 +4681,10 @@
                 </a:effectLst>
                 <a:latin typeface="Calibri" panose="020F0502020204030204" pitchFamily="34" charset="0"/>
               </a:rPr>
-              <a:t>Ryan </a:t>
-            </a:r>
-            <a:r>
-              <a:rPr lang="en-US" sz="6000" b="1" dirty="0" err="1" smtClean="0">
+              <a:t>Ryan Conyac, William </a:t>
+            </a:r>
+            <a:r>
+              <a:rPr lang="en-US" sz="6000" b="1" dirty="0" smtClean="0">
                 <a:solidFill>
                   <a:schemeClr val="bg1"/>
                 </a:solidFill>
@@ -4738,10 +4697,10 @@
                 </a:effectLst>
                 <a:latin typeface="Calibri" panose="020F0502020204030204" pitchFamily="34" charset="0"/>
               </a:rPr>
-              <a:t>Conyac</a:t>
-            </a:r>
-            <a:r>
-              <a:rPr lang="en-US" sz="6000" b="1" dirty="0" smtClean="0">
+              <a:t>McLain, Michael McGregor, </a:t>
+            </a:r>
+            <a:r>
+              <a:rPr lang="en-US" sz="6000" b="1" dirty="0" err="1" smtClean="0">
                 <a:solidFill>
                   <a:schemeClr val="bg1"/>
                 </a:solidFill>
@@ -4754,7 +4713,23 @@
                 </a:effectLst>
                 <a:latin typeface="Calibri" panose="020F0502020204030204" pitchFamily="34" charset="0"/>
               </a:rPr>
-              <a:t>, William McLain </a:t>
+              <a:t>Yuchen</a:t>
+            </a:r>
+            <a:r>
+              <a:rPr lang="en-US" sz="6000" b="1" dirty="0" smtClean="0">
+                <a:solidFill>
+                  <a:schemeClr val="bg1"/>
+                </a:solidFill>
+                <a:effectLst>
+                  <a:outerShdw blurRad="38100" dist="38100" dir="2700000" algn="tl">
+                    <a:srgbClr val="000000">
+                      <a:alpha val="43137"/>
+                    </a:srgbClr>
+                  </a:outerShdw>
+                </a:effectLst>
+                <a:latin typeface="Calibri" panose="020F0502020204030204" pitchFamily="34" charset="0"/>
+              </a:rPr>
+              <a:t> Feng, Brian Davis </a:t>
             </a:r>
             <a:r>
               <a:rPr lang="en-US" sz="4000" b="1" dirty="0" smtClean="0">
@@ -4762,7 +4737,15 @@
                   <a:schemeClr val="bg1"/>
                 </a:solidFill>
               </a:rPr>
-              <a:t> - Dr. Hong K. Sung (Faculty Advisor)</a:t>
+              <a:t> </a:t>
+            </a:r>
+            <a:r>
+              <a:rPr lang="en-US" sz="4000" b="1" dirty="0" smtClean="0">
+                <a:solidFill>
+                  <a:schemeClr val="bg1"/>
+                </a:solidFill>
+              </a:rPr>
+              <a:t>- Dr. Hong K. Sung (Faculty Advisor)</a:t>
             </a:r>
             <a:endParaRPr lang="en-US" sz="4800" b="1" dirty="0">
               <a:solidFill>
@@ -4929,7 +4912,6 @@
               <a:rPr lang="en-US" sz="3600" dirty="0" smtClean="0"/>
               <a:t>. We were all familiar with and enjoyed these titles growing up so having the chance to create our own version seemed exciting. </a:t>
             </a:r>
-            <a:endParaRPr lang="en-US" sz="3600" dirty="0" smtClean="0"/>
           </a:p>
           <a:p>
             <a:pPr eaLnBrk="1" hangingPunct="1"/>
@@ -4941,7 +4923,6 @@
               <a:rPr lang="en-US" sz="3600" dirty="0" smtClean="0"/>
               <a:t>We knew that our game needed to have the ability to offer a variety of ships. Also we need a range of weapons with the option for the player to choose not to acquire them if he or she did not want them. And finally the different types of weapons needed to have different types of sounds when used. </a:t>
             </a:r>
-            <a:endParaRPr lang="en-US" sz="3600" dirty="0" smtClean="0"/>
           </a:p>
         </p:txBody>
       </p:sp>
@@ -5269,7 +5250,7 @@
           <p:nvPr/>
         </p:nvPicPr>
         <p:blipFill rotWithShape="1">
-          <a:blip r:embed="rId5" cstate="print">
+          <a:blip r:embed="rId4" cstate="print">
             <a:extLst>
               <a:ext uri="{28A0092B-C50C-407E-A947-70E740481C1C}">
                 <a14:useLocalDpi xmlns:a14="http://schemas.microsoft.com/office/drawing/2010/main" val="0"/>
@@ -5302,7 +5283,7 @@
           <p:nvPr/>
         </p:nvPicPr>
         <p:blipFill>
-          <a:blip r:embed="rId6" cstate="print">
+          <a:blip r:embed="rId5" cstate="print">
             <a:extLst>
               <a:ext uri="{28A0092B-C50C-407E-A947-70E740481C1C}">
                 <a14:useLocalDpi xmlns:a14="http://schemas.microsoft.com/office/drawing/2010/main" val="0"/>
@@ -5630,7 +5611,6 @@
               <a:rPr lang="en-US" sz="3600" dirty="0" smtClean="0"/>
               <a:t>For the option to allow players to select different ships and weapons we need to use the state design pattern. This way when selecting different weapons the ship will obtain a new state to show that the player actually acquired the weapon. This is also used for the ship selection. </a:t>
             </a:r>
-            <a:endParaRPr lang="en-US" sz="3600" dirty="0" smtClean="0"/>
           </a:p>
           <a:p>
             <a:pPr eaLnBrk="1" hangingPunct="1">
@@ -6674,7 +6654,6 @@
               <a:rPr lang="en-US" sz="3600" dirty="0" smtClean="0"/>
               <a:t>The result in using state design pattern and java applet for in game sounds was a success. The process went smoothly and all team members were satisfied with the decision. :</a:t>
             </a:r>
-            <a:endParaRPr lang="en-US" sz="3600" dirty="0" smtClean="0"/>
           </a:p>
           <a:p>
             <a:pPr marL="571500" indent="-571500" eaLnBrk="1" hangingPunct="1">
@@ -6689,19 +6668,7 @@
             </a:pPr>
             <a:r>
               <a:rPr lang="en-US" sz="3600" dirty="0" smtClean="0"/>
-              <a:t>Natural and </a:t>
-            </a:r>
-            <a:r>
-              <a:rPr lang="en-US" sz="3600" dirty="0" smtClean="0"/>
-              <a:t>customizable</a:t>
-            </a:r>
-            <a:r>
-              <a:rPr lang="en-US" sz="3600" dirty="0" smtClean="0"/>
-              <a:t> </a:t>
-            </a:r>
-            <a:r>
-              <a:rPr lang="en-US" sz="3600" dirty="0" smtClean="0"/>
-              <a:t>game play. </a:t>
+              <a:t>Natural and customizable game play. </a:t>
             </a:r>
           </a:p>
           <a:p>
@@ -6717,13 +6684,8 @@
             </a:pPr>
             <a:r>
               <a:rPr lang="en-US" sz="3600" dirty="0" smtClean="0"/>
-              <a:t>Option of implementing </a:t>
-            </a:r>
-            <a:r>
-              <a:rPr lang="en-US" sz="3600" dirty="0" smtClean="0"/>
-              <a:t>different ships.</a:t>
-            </a:r>
-            <a:endParaRPr lang="en-US" sz="3600" dirty="0" smtClean="0"/>
+              <a:t>Option of implementing different ships.</a:t>
+            </a:r>
           </a:p>
           <a:p>
             <a:pPr marL="571500" indent="-571500" eaLnBrk="1" hangingPunct="1">
@@ -6924,7 +6886,6 @@
               <a:rPr lang="en-US" sz="3600" dirty="0" smtClean="0"/>
               <a:t>Give the player an at the beginning of the game of what ship to use..</a:t>
             </a:r>
-            <a:endParaRPr lang="en-US" sz="3600" dirty="0" smtClean="0"/>
           </a:p>
           <a:p>
             <a:pPr marL="1314450" lvl="1" indent="-571500" eaLnBrk="1" hangingPunct="1">
@@ -6941,7 +6902,6 @@
               <a:rPr lang="en-US" sz="3600" dirty="0" smtClean="0"/>
               <a:t>Depending on the user’s choice change the ship’s appearance and attributes </a:t>
             </a:r>
-            <a:endParaRPr lang="en-US" sz="3600" dirty="0" smtClean="0"/>
           </a:p>
           <a:p>
             <a:pPr eaLnBrk="1" hangingPunct="1">
@@ -6981,7 +6941,6 @@
               <a:rPr lang="en-US" sz="3600" dirty="0" smtClean="0"/>
               <a:t>Change the bullet appearance from the initial image.  </a:t>
             </a:r>
-            <a:endParaRPr lang="en-US" sz="3600" dirty="0" smtClean="0"/>
           </a:p>
           <a:p>
             <a:pPr marL="1714500" lvl="2" indent="-571500" eaLnBrk="1" hangingPunct="1">
@@ -7046,13 +7005,8 @@
             </a:pPr>
             <a:r>
               <a:rPr lang="en-US" sz="3600" dirty="0" smtClean="0"/>
-              <a:t>Game play is simple and redundant</a:t>
-            </a:r>
-            <a:r>
-              <a:rPr lang="en-US" sz="3600" dirty="0" smtClean="0"/>
-              <a:t>..</a:t>
-            </a:r>
-            <a:endParaRPr lang="en-US" sz="3600" dirty="0" smtClean="0"/>
+              <a:t>Game play is simple and redundant..</a:t>
+            </a:r>
           </a:p>
           <a:p>
             <a:pPr eaLnBrk="1" hangingPunct="1">
@@ -7065,13 +7019,8 @@
             </a:pPr>
             <a:r>
               <a:rPr lang="en-US" sz="3600" b="1" dirty="0" smtClean="0"/>
-              <a:t>Use </a:t>
-            </a:r>
-            <a:r>
-              <a:rPr lang="en-US" sz="3600" b="1" dirty="0" smtClean="0"/>
-              <a:t>of different sounds</a:t>
-            </a:r>
-            <a:endParaRPr lang="en-US" sz="3600" b="1" dirty="0" smtClean="0"/>
+              <a:t>Use of different sounds</a:t>
+            </a:r>
           </a:p>
           <a:p>
             <a:pPr marL="1314450" lvl="1" indent="-571500" eaLnBrk="1" hangingPunct="1">
@@ -7136,7 +7085,6 @@
               <a:rPr lang="en-US" sz="3600" dirty="0" smtClean="0"/>
               <a:t>Have a different sound accompany each type of weapon for the ship.  </a:t>
             </a:r>
-            <a:endParaRPr lang="en-US" sz="3600" dirty="0" smtClean="0"/>
           </a:p>
           <a:p>
             <a:pPr eaLnBrk="1" hangingPunct="1">
@@ -7148,293 +7096,6 @@
               </a:spcAft>
             </a:pPr>
             <a:endParaRPr lang="en-US" sz="2800" dirty="0" smtClean="0"/>
-          </a:p>
-        </p:txBody>
-      </p:sp>
-      <p:pic>
-        <p:nvPicPr>
-          <p:cNvPr id="57" name="Picture 56"/>
-          <p:cNvPicPr>
-            <a:picLocks noChangeAspect="1"/>
-          </p:cNvPicPr>
-          <p:nvPr/>
-        </p:nvPicPr>
-        <p:blipFill>
-          <a:blip r:embed="rId7">
-            <a:extLst>
-              <a:ext uri="{28A0092B-C50C-407E-A947-70E740481C1C}">
-                <a14:useLocalDpi xmlns:a14="http://schemas.microsoft.com/office/drawing/2010/main" val="0"/>
-              </a:ext>
-            </a:extLst>
-          </a:blip>
-          <a:stretch>
-            <a:fillRect/>
-          </a:stretch>
-        </p:blipFill>
-        <p:spPr>
-          <a:xfrm>
-            <a:off x="11565993" y="6532212"/>
-            <a:ext cx="5319473" cy="3999995"/>
-          </a:xfrm>
-          <a:prstGeom prst="rect">
-            <a:avLst/>
-          </a:prstGeom>
-          <a:ln w="12700">
-            <a:solidFill>
-              <a:schemeClr val="bg1"/>
-            </a:solidFill>
-          </a:ln>
-          <a:effectLst>
-            <a:outerShdw blurRad="50800" dist="38100" dir="2700000" algn="tl" rotWithShape="0">
-              <a:prstClr val="black">
-                <a:alpha val="40000"/>
-              </a:prstClr>
-            </a:outerShdw>
-          </a:effectLst>
-        </p:spPr>
-      </p:pic>
-      <p:pic>
-        <p:nvPicPr>
-          <p:cNvPr id="58" name="Picture 57"/>
-          <p:cNvPicPr>
-            <a:picLocks noChangeAspect="1"/>
-          </p:cNvPicPr>
-          <p:nvPr/>
-        </p:nvPicPr>
-        <p:blipFill>
-          <a:blip r:embed="rId8">
-            <a:extLst>
-              <a:ext uri="{28A0092B-C50C-407E-A947-70E740481C1C}">
-                <a14:useLocalDpi xmlns:a14="http://schemas.microsoft.com/office/drawing/2010/main" val="0"/>
-              </a:ext>
-            </a:extLst>
-          </a:blip>
-          <a:stretch>
-            <a:fillRect/>
-          </a:stretch>
-        </p:blipFill>
-        <p:spPr>
-          <a:xfrm>
-            <a:off x="9489890" y="9742782"/>
-            <a:ext cx="5434231" cy="4086288"/>
-          </a:xfrm>
-          <a:prstGeom prst="rect">
-            <a:avLst/>
-          </a:prstGeom>
-          <a:ln w="12700">
-            <a:solidFill>
-              <a:schemeClr val="bg1"/>
-            </a:solidFill>
-          </a:ln>
-          <a:effectLst>
-            <a:outerShdw blurRad="50800" dist="38100" dir="2700000" algn="tl" rotWithShape="0">
-              <a:prstClr val="black">
-                <a:alpha val="40000"/>
-              </a:prstClr>
-            </a:outerShdw>
-          </a:effectLst>
-        </p:spPr>
-      </p:pic>
-      <p:grpSp>
-        <p:nvGrpSpPr>
-          <p:cNvPr id="87" name="Group 86"/>
-          <p:cNvGrpSpPr/>
-          <p:nvPr/>
-        </p:nvGrpSpPr>
-        <p:grpSpPr>
-          <a:xfrm>
-            <a:off x="30860217" y="11171583"/>
-            <a:ext cx="12385374" cy="6674651"/>
-            <a:chOff x="30948379" y="11063583"/>
-            <a:chExt cx="12800150" cy="6050280"/>
-          </a:xfrm>
-          <a:effectLst>
-            <a:outerShdw blurRad="50800" dist="38100" dir="2700000" algn="tl" rotWithShape="0">
-              <a:prstClr val="black">
-                <a:alpha val="40000"/>
-              </a:prstClr>
-            </a:outerShdw>
-          </a:effectLst>
-        </p:grpSpPr>
-        <p:sp>
-          <p:nvSpPr>
-            <p:cNvPr id="85" name="Rounded Rectangle 84"/>
-            <p:cNvSpPr/>
-            <p:nvPr/>
-          </p:nvSpPr>
-          <p:spPr bwMode="auto">
-            <a:xfrm>
-              <a:off x="30948379" y="11063583"/>
-              <a:ext cx="12800150" cy="6050280"/>
-            </a:xfrm>
-            <a:prstGeom prst="roundRect">
-              <a:avLst/>
-            </a:prstGeom>
-            <a:solidFill>
-              <a:schemeClr val="bg1"/>
-            </a:solidFill>
-            <a:ln w="9525" cap="flat" cmpd="sng" algn="ctr">
-              <a:solidFill>
-                <a:schemeClr val="tx1"/>
-              </a:solidFill>
-              <a:prstDash val="solid"/>
-              <a:round/>
-              <a:headEnd type="none" w="med" len="med"/>
-              <a:tailEnd type="none" w="med" len="med"/>
-            </a:ln>
-            <a:effectLst/>
-          </p:spPr>
-          <p:txBody>
-            <a:bodyPr vert="horz" wrap="square" lIns="91440" tIns="45720" rIns="91440" bIns="45720" numCol="1" rtlCol="0" anchor="t" anchorCtr="0" compatLnSpc="1">
-              <a:prstTxWarp prst="textNoShape">
-                <a:avLst/>
-              </a:prstTxWarp>
-            </a:bodyPr>
-            <a:lstStyle/>
-            <a:p>
-              <a:pPr marL="0" marR="0" indent="0" algn="l" defTabSz="4703763" rtl="0" eaLnBrk="1" fontAlgn="base" latinLnBrk="0" hangingPunct="1">
-                <a:lnSpc>
-                  <a:spcPct val="100000"/>
-                </a:lnSpc>
-                <a:spcBef>
-                  <a:spcPct val="0"/>
-                </a:spcBef>
-                <a:spcAft>
-                  <a:spcPct val="0"/>
-                </a:spcAft>
-                <a:buClrTx/>
-                <a:buSzTx/>
-                <a:buFontTx/>
-                <a:buNone/>
-                <a:tabLst/>
-              </a:pPr>
-              <a:endParaRPr kumimoji="0" lang="en-US" sz="3000" b="0" i="0" u="none" strike="noStrike" cap="none" normalizeH="0" baseline="0" smtClean="0">
-                <a:ln>
-                  <a:noFill/>
-                </a:ln>
-                <a:solidFill>
-                  <a:schemeClr val="tx1"/>
-                </a:solidFill>
-                <a:effectLst/>
-                <a:latin typeface="Arial" charset="0"/>
-              </a:endParaRPr>
-            </a:p>
-          </p:txBody>
-        </p:sp>
-        <p:pic>
-          <p:nvPicPr>
-            <p:cNvPr id="4" name="Picture 3"/>
-            <p:cNvPicPr>
-              <a:picLocks noChangeAspect="1"/>
-            </p:cNvPicPr>
-            <p:nvPr/>
-          </p:nvPicPr>
-          <p:blipFill>
-            <a:blip r:embed="rId9"/>
-            <a:stretch>
-              <a:fillRect/>
-            </a:stretch>
-          </p:blipFill>
-          <p:spPr>
-            <a:xfrm>
-              <a:off x="31363155" y="11403034"/>
-              <a:ext cx="11970598" cy="5355267"/>
-            </a:xfrm>
-            <a:prstGeom prst="rect">
-              <a:avLst/>
-            </a:prstGeom>
-            <a:ln>
-              <a:noFill/>
-            </a:ln>
-            <a:effectLst/>
-          </p:spPr>
-        </p:pic>
-      </p:grpSp>
-      <p:sp>
-        <p:nvSpPr>
-          <p:cNvPr id="10" name="Right Arrow 9"/>
-          <p:cNvSpPr/>
-          <p:nvPr/>
-        </p:nvSpPr>
-        <p:spPr bwMode="auto">
-          <a:xfrm>
-            <a:off x="10840385" y="28211294"/>
-            <a:ext cx="2185131" cy="1306147"/>
-          </a:xfrm>
-          <a:prstGeom prst="rightArrow">
-            <a:avLst/>
-          </a:prstGeom>
-          <a:gradFill flip="none" rotWithShape="1">
-            <a:gsLst>
-              <a:gs pos="0">
-                <a:schemeClr val="accent1">
-                  <a:shade val="30000"/>
-                  <a:satMod val="115000"/>
-                </a:schemeClr>
-              </a:gs>
-              <a:gs pos="50000">
-                <a:schemeClr val="accent1">
-                  <a:shade val="67500"/>
-                  <a:satMod val="115000"/>
-                </a:schemeClr>
-              </a:gs>
-              <a:gs pos="100000">
-                <a:schemeClr val="accent1">
-                  <a:shade val="100000"/>
-                  <a:satMod val="115000"/>
-                </a:schemeClr>
-              </a:gs>
-            </a:gsLst>
-            <a:lin ang="16200000" scaled="1"/>
-            <a:tileRect/>
-          </a:gradFill>
-          <a:ln w="9525" cap="flat" cmpd="sng" algn="ctr">
-            <a:solidFill>
-              <a:schemeClr val="accent6">
-                <a:lumMod val="50000"/>
-              </a:schemeClr>
-            </a:solidFill>
-            <a:prstDash val="solid"/>
-            <a:round/>
-            <a:headEnd type="none" w="med" len="med"/>
-            <a:tailEnd type="none" w="med" len="med"/>
-          </a:ln>
-          <a:effectLst/>
-        </p:spPr>
-        <p:txBody>
-          <a:bodyPr vert="horz" wrap="square" lIns="91440" tIns="45720" rIns="91440" bIns="45720" numCol="1" rtlCol="0" anchor="t" anchorCtr="0" compatLnSpc="1">
-            <a:prstTxWarp prst="textNoShape">
-              <a:avLst/>
-            </a:prstTxWarp>
-          </a:bodyPr>
-          <a:lstStyle/>
-          <a:p>
-            <a:pPr marL="0" marR="0" indent="0" algn="l" defTabSz="4703763" rtl="0" eaLnBrk="1" fontAlgn="base" latinLnBrk="0" hangingPunct="1">
-              <a:lnSpc>
-                <a:spcPct val="100000"/>
-              </a:lnSpc>
-              <a:spcBef>
-                <a:spcPct val="0"/>
-              </a:spcBef>
-              <a:spcAft>
-                <a:spcPct val="0"/>
-              </a:spcAft>
-              <a:buClrTx/>
-              <a:buSzTx/>
-              <a:buFontTx/>
-              <a:buNone/>
-              <a:tabLst/>
-            </a:pPr>
-            <a:endParaRPr kumimoji="0" lang="en-US" sz="3000" b="0" i="0" u="none" strike="noStrike" cap="none" normalizeH="0" baseline="0" smtClean="0">
-              <a:ln>
-                <a:noFill/>
-              </a:ln>
-              <a:solidFill>
-                <a:schemeClr val="tx1"/>
-              </a:solidFill>
-              <a:effectLst/>
-              <a:latin typeface="Arial" charset="0"/>
-            </a:endParaRPr>
           </a:p>
         </p:txBody>
       </p:sp>
@@ -8076,625 +7737,6 @@
           </a:p>
         </p:txBody>
       </p:sp>
-      <p:grpSp>
-        <p:nvGrpSpPr>
-          <p:cNvPr id="17" name="Group 16"/>
-          <p:cNvGrpSpPr/>
-          <p:nvPr/>
-        </p:nvGrpSpPr>
-        <p:grpSpPr>
-          <a:xfrm>
-            <a:off x="31475815" y="18285903"/>
-            <a:ext cx="11660987" cy="3847823"/>
-            <a:chOff x="31106263" y="18897600"/>
-            <a:chExt cx="12632537" cy="4248150"/>
-          </a:xfrm>
-        </p:grpSpPr>
-        <p:sp>
-          <p:nvSpPr>
-            <p:cNvPr id="16" name="Rounded Rectangle 15"/>
-            <p:cNvSpPr/>
-            <p:nvPr/>
-          </p:nvSpPr>
-          <p:spPr bwMode="auto">
-            <a:xfrm>
-              <a:off x="31106263" y="18897600"/>
-              <a:ext cx="12632537" cy="4248150"/>
-            </a:xfrm>
-            <a:prstGeom prst="roundRect">
-              <a:avLst/>
-            </a:prstGeom>
-            <a:solidFill>
-              <a:schemeClr val="bg1"/>
-            </a:solidFill>
-            <a:ln w="9525" cap="flat" cmpd="sng" algn="ctr">
-              <a:solidFill>
-                <a:schemeClr val="tx1"/>
-              </a:solidFill>
-              <a:prstDash val="solid"/>
-              <a:round/>
-              <a:headEnd type="none" w="med" len="med"/>
-              <a:tailEnd type="none" w="med" len="med"/>
-            </a:ln>
-            <a:effectLst>
-              <a:outerShdw blurRad="50800" dist="38100" dir="2700000" algn="tl" rotWithShape="0">
-                <a:prstClr val="black">
-                  <a:alpha val="40000"/>
-                </a:prstClr>
-              </a:outerShdw>
-            </a:effectLst>
-          </p:spPr>
-          <p:txBody>
-            <a:bodyPr vert="horz" wrap="square" lIns="91440" tIns="45720" rIns="91440" bIns="45720" numCol="1" rtlCol="0" anchor="t" anchorCtr="0" compatLnSpc="1">
-              <a:prstTxWarp prst="textNoShape">
-                <a:avLst/>
-              </a:prstTxWarp>
-            </a:bodyPr>
-            <a:lstStyle/>
-            <a:p>
-              <a:pPr marL="0" marR="0" indent="0" algn="l" defTabSz="4703763" rtl="0" eaLnBrk="1" fontAlgn="base" latinLnBrk="0" hangingPunct="1">
-                <a:lnSpc>
-                  <a:spcPct val="100000"/>
-                </a:lnSpc>
-                <a:spcBef>
-                  <a:spcPct val="0"/>
-                </a:spcBef>
-                <a:spcAft>
-                  <a:spcPct val="0"/>
-                </a:spcAft>
-                <a:buClrTx/>
-                <a:buSzTx/>
-                <a:buFontTx/>
-                <a:buNone/>
-                <a:tabLst/>
-              </a:pPr>
-              <a:endParaRPr kumimoji="0" lang="en-US" sz="3000" b="0" i="0" u="none" strike="noStrike" cap="none" normalizeH="0" baseline="0" smtClean="0">
-                <a:ln>
-                  <a:noFill/>
-                </a:ln>
-                <a:solidFill>
-                  <a:schemeClr val="tx1"/>
-                </a:solidFill>
-                <a:effectLst/>
-                <a:latin typeface="Arial" charset="0"/>
-              </a:endParaRPr>
-            </a:p>
-          </p:txBody>
-        </p:sp>
-        <p:pic>
-          <p:nvPicPr>
-            <p:cNvPr id="11" name="Picture 10"/>
-            <p:cNvPicPr>
-              <a:picLocks noChangeAspect="1"/>
-            </p:cNvPicPr>
-            <p:nvPr/>
-          </p:nvPicPr>
-          <p:blipFill>
-            <a:blip r:embed="rId10"/>
-            <a:stretch>
-              <a:fillRect/>
-            </a:stretch>
-          </p:blipFill>
-          <p:spPr>
-            <a:xfrm>
-              <a:off x="31475815" y="19275760"/>
-              <a:ext cx="11970598" cy="3580147"/>
-            </a:xfrm>
-            <a:prstGeom prst="rect">
-              <a:avLst/>
-            </a:prstGeom>
-            <a:effectLst/>
-          </p:spPr>
-        </p:pic>
-      </p:grpSp>
-      <p:grpSp>
-        <p:nvGrpSpPr>
-          <p:cNvPr id="15" name="Group 14"/>
-          <p:cNvGrpSpPr/>
-          <p:nvPr/>
-        </p:nvGrpSpPr>
-        <p:grpSpPr>
-          <a:xfrm>
-            <a:off x="23767940" y="24216360"/>
-            <a:ext cx="7664552" cy="8284459"/>
-            <a:chOff x="24414902" y="24886919"/>
-            <a:chExt cx="7017590" cy="7613899"/>
-          </a:xfrm>
-        </p:grpSpPr>
-        <p:sp>
-          <p:nvSpPr>
-            <p:cNvPr id="14" name="Rounded Rectangle 13"/>
-            <p:cNvSpPr/>
-            <p:nvPr/>
-          </p:nvSpPr>
-          <p:spPr bwMode="auto">
-            <a:xfrm>
-              <a:off x="24414902" y="24886919"/>
-              <a:ext cx="7017590" cy="7613899"/>
-            </a:xfrm>
-            <a:prstGeom prst="roundRect">
-              <a:avLst/>
-            </a:prstGeom>
-            <a:solidFill>
-              <a:schemeClr val="bg1"/>
-            </a:solidFill>
-            <a:ln w="9525" cap="flat" cmpd="sng" algn="ctr">
-              <a:solidFill>
-                <a:schemeClr val="accent6">
-                  <a:lumMod val="50000"/>
-                </a:schemeClr>
-              </a:solidFill>
-              <a:prstDash val="solid"/>
-              <a:round/>
-              <a:headEnd type="none" w="med" len="med"/>
-              <a:tailEnd type="none" w="med" len="med"/>
-            </a:ln>
-            <a:effectLst>
-              <a:outerShdw blurRad="50800" dist="38100" dir="2700000" algn="tl" rotWithShape="0">
-                <a:prstClr val="black">
-                  <a:alpha val="40000"/>
-                </a:prstClr>
-              </a:outerShdw>
-            </a:effectLst>
-          </p:spPr>
-          <p:txBody>
-            <a:bodyPr vert="horz" wrap="square" lIns="91440" tIns="45720" rIns="91440" bIns="45720" numCol="1" rtlCol="0" anchor="t" anchorCtr="0" compatLnSpc="1">
-              <a:prstTxWarp prst="textNoShape">
-                <a:avLst/>
-              </a:prstTxWarp>
-            </a:bodyPr>
-            <a:lstStyle/>
-            <a:p>
-              <a:pPr marL="0" marR="0" indent="0" algn="l" defTabSz="4703763" rtl="0" eaLnBrk="1" fontAlgn="base" latinLnBrk="0" hangingPunct="1">
-                <a:lnSpc>
-                  <a:spcPct val="100000"/>
-                </a:lnSpc>
-                <a:spcBef>
-                  <a:spcPct val="0"/>
-                </a:spcBef>
-                <a:spcAft>
-                  <a:spcPct val="0"/>
-                </a:spcAft>
-                <a:buClrTx/>
-                <a:buSzTx/>
-                <a:buFontTx/>
-                <a:buNone/>
-                <a:tabLst/>
-              </a:pPr>
-              <a:endParaRPr kumimoji="0" lang="en-US" sz="3000" b="0" i="0" u="none" strike="noStrike" cap="none" normalizeH="0" baseline="0" smtClean="0">
-                <a:ln>
-                  <a:noFill/>
-                </a:ln>
-                <a:solidFill>
-                  <a:schemeClr val="tx1"/>
-                </a:solidFill>
-                <a:effectLst/>
-                <a:latin typeface="Arial" charset="0"/>
-              </a:endParaRPr>
-            </a:p>
-          </p:txBody>
-        </p:sp>
-        <p:pic>
-          <p:nvPicPr>
-            <p:cNvPr id="12" name="Picture 11"/>
-            <p:cNvPicPr>
-              <a:picLocks noChangeAspect="1"/>
-            </p:cNvPicPr>
-            <p:nvPr/>
-          </p:nvPicPr>
-          <p:blipFill>
-            <a:blip r:embed="rId11"/>
-            <a:stretch>
-              <a:fillRect/>
-            </a:stretch>
-          </p:blipFill>
-          <p:spPr>
-            <a:xfrm>
-              <a:off x="24565313" y="27577617"/>
-              <a:ext cx="6716768" cy="4224461"/>
-            </a:xfrm>
-            <a:prstGeom prst="rect">
-              <a:avLst/>
-            </a:prstGeom>
-          </p:spPr>
-        </p:pic>
-        <p:pic>
-          <p:nvPicPr>
-            <p:cNvPr id="13" name="Picture 12"/>
-            <p:cNvPicPr>
-              <a:picLocks noChangeAspect="1"/>
-            </p:cNvPicPr>
-            <p:nvPr/>
-          </p:nvPicPr>
-          <p:blipFill>
-            <a:blip r:embed="rId12"/>
-            <a:stretch>
-              <a:fillRect/>
-            </a:stretch>
-          </p:blipFill>
-          <p:spPr>
-            <a:xfrm>
-              <a:off x="24618081" y="25507043"/>
-              <a:ext cx="6488182" cy="2128935"/>
-            </a:xfrm>
-            <a:prstGeom prst="rect">
-              <a:avLst/>
-            </a:prstGeom>
-          </p:spPr>
-        </p:pic>
-      </p:grpSp>
-      <p:sp>
-        <p:nvSpPr>
-          <p:cNvPr id="212" name="Text Box 55"/>
-          <p:cNvSpPr txBox="1">
-            <a:spLocks noChangeArrowheads="1"/>
-          </p:cNvSpPr>
-          <p:nvPr/>
-        </p:nvSpPr>
-        <p:spPr bwMode="auto">
-          <a:xfrm>
-            <a:off x="31528645" y="22476541"/>
-            <a:ext cx="12362555" cy="2477601"/>
-          </a:xfrm>
-          <a:prstGeom prst="rect">
-            <a:avLst/>
-          </a:prstGeom>
-          <a:noFill/>
-          <a:ln>
-            <a:noFill/>
-          </a:ln>
-          <a:extLst>
-            <a:ext uri="{909E8E84-426E-40DD-AFC4-6F175D3DCCD1}">
-              <a14:hiddenFill xmlns:a14="http://schemas.microsoft.com/office/drawing/2010/main">
-                <a:solidFill>
-                  <a:srgbClr val="FFFFFF"/>
-                </a:solidFill>
-              </a14:hiddenFill>
-            </a:ext>
-            <a:ext uri="{91240B29-F687-4F45-9708-019B960494DF}">
-              <a14:hiddenLine xmlns:a14="http://schemas.microsoft.com/office/drawing/2010/main" w="9525">
-                <a:solidFill>
-                  <a:srgbClr val="000000"/>
-                </a:solidFill>
-                <a:miter lim="800000"/>
-                <a:headEnd/>
-                <a:tailEnd/>
-              </a14:hiddenLine>
-            </a:ext>
-          </a:extLst>
-        </p:spPr>
-        <p:txBody>
-          <a:bodyPr wrap="square" lIns="137160" tIns="68580" rIns="137160" bIns="68580">
-            <a:spAutoFit/>
-          </a:bodyPr>
-          <a:lstStyle>
-            <a:lvl1pPr eaLnBrk="0" hangingPunct="0">
-              <a:defRPr sz="3000">
-                <a:solidFill>
-                  <a:schemeClr val="tx1"/>
-                </a:solidFill>
-                <a:latin typeface="Arial" panose="020B0604020202020204" pitchFamily="34" charset="0"/>
-              </a:defRPr>
-            </a:lvl1pPr>
-            <a:lvl2pPr marL="742950" indent="-285750" eaLnBrk="0" hangingPunct="0">
-              <a:defRPr sz="3000">
-                <a:solidFill>
-                  <a:schemeClr val="tx1"/>
-                </a:solidFill>
-                <a:latin typeface="Arial" panose="020B0604020202020204" pitchFamily="34" charset="0"/>
-              </a:defRPr>
-            </a:lvl2pPr>
-            <a:lvl3pPr marL="1143000" indent="-228600" eaLnBrk="0" hangingPunct="0">
-              <a:defRPr sz="3000">
-                <a:solidFill>
-                  <a:schemeClr val="tx1"/>
-                </a:solidFill>
-                <a:latin typeface="Arial" panose="020B0604020202020204" pitchFamily="34" charset="0"/>
-              </a:defRPr>
-            </a:lvl3pPr>
-            <a:lvl4pPr marL="1600200" indent="-228600" eaLnBrk="0" hangingPunct="0">
-              <a:defRPr sz="3000">
-                <a:solidFill>
-                  <a:schemeClr val="tx1"/>
-                </a:solidFill>
-                <a:latin typeface="Arial" panose="020B0604020202020204" pitchFamily="34" charset="0"/>
-              </a:defRPr>
-            </a:lvl4pPr>
-            <a:lvl5pPr marL="2057400" indent="-228600" eaLnBrk="0" hangingPunct="0">
-              <a:defRPr sz="3000">
-                <a:solidFill>
-                  <a:schemeClr val="tx1"/>
-                </a:solidFill>
-                <a:latin typeface="Arial" panose="020B0604020202020204" pitchFamily="34" charset="0"/>
-              </a:defRPr>
-            </a:lvl5pPr>
-            <a:lvl6pPr marL="2514600" indent="-228600" eaLnBrk="0" fontAlgn="base" hangingPunct="0">
-              <a:spcBef>
-                <a:spcPct val="0"/>
-              </a:spcBef>
-              <a:spcAft>
-                <a:spcPct val="0"/>
-              </a:spcAft>
-              <a:defRPr sz="3000">
-                <a:solidFill>
-                  <a:schemeClr val="tx1"/>
-                </a:solidFill>
-                <a:latin typeface="Arial" panose="020B0604020202020204" pitchFamily="34" charset="0"/>
-              </a:defRPr>
-            </a:lvl6pPr>
-            <a:lvl7pPr marL="2971800" indent="-228600" eaLnBrk="0" fontAlgn="base" hangingPunct="0">
-              <a:spcBef>
-                <a:spcPct val="0"/>
-              </a:spcBef>
-              <a:spcAft>
-                <a:spcPct val="0"/>
-              </a:spcAft>
-              <a:defRPr sz="3000">
-                <a:solidFill>
-                  <a:schemeClr val="tx1"/>
-                </a:solidFill>
-                <a:latin typeface="Arial" panose="020B0604020202020204" pitchFamily="34" charset="0"/>
-              </a:defRPr>
-            </a:lvl7pPr>
-            <a:lvl8pPr marL="3429000" indent="-228600" eaLnBrk="0" fontAlgn="base" hangingPunct="0">
-              <a:spcBef>
-                <a:spcPct val="0"/>
-              </a:spcBef>
-              <a:spcAft>
-                <a:spcPct val="0"/>
-              </a:spcAft>
-              <a:defRPr sz="3000">
-                <a:solidFill>
-                  <a:schemeClr val="tx1"/>
-                </a:solidFill>
-                <a:latin typeface="Arial" panose="020B0604020202020204" pitchFamily="34" charset="0"/>
-              </a:defRPr>
-            </a:lvl8pPr>
-            <a:lvl9pPr marL="3886200" indent="-228600" eaLnBrk="0" fontAlgn="base" hangingPunct="0">
-              <a:spcBef>
-                <a:spcPct val="0"/>
-              </a:spcBef>
-              <a:spcAft>
-                <a:spcPct val="0"/>
-              </a:spcAft>
-              <a:defRPr sz="3000">
-                <a:solidFill>
-                  <a:schemeClr val="tx1"/>
-                </a:solidFill>
-                <a:latin typeface="Arial" panose="020B0604020202020204" pitchFamily="34" charset="0"/>
-              </a:defRPr>
-            </a:lvl9pPr>
-          </a:lstStyle>
-          <a:p>
-            <a:pPr eaLnBrk="1" hangingPunct="1">
-              <a:spcBef>
-                <a:spcPts val="1200"/>
-              </a:spcBef>
-              <a:spcAft>
-                <a:spcPts val="1200"/>
-              </a:spcAft>
-            </a:pPr>
-            <a:r>
-              <a:rPr lang="en-US" sz="2800" dirty="0" smtClean="0"/>
-              <a:t>Rotation sets the “facing” component.</a:t>
-            </a:r>
-          </a:p>
-          <a:p>
-            <a:pPr eaLnBrk="1" hangingPunct="1">
-              <a:spcBef>
-                <a:spcPts val="1200"/>
-              </a:spcBef>
-              <a:spcAft>
-                <a:spcPts val="1200"/>
-              </a:spcAft>
-            </a:pPr>
-            <a:r>
-              <a:rPr lang="en-US" sz="2800" dirty="0" smtClean="0"/>
-              <a:t>Thrust is accelerated at a constant rate of 2 pixels per tick up to the </a:t>
-            </a:r>
-            <a:br>
-              <a:rPr lang="en-US" sz="2800" dirty="0" smtClean="0"/>
-            </a:br>
-            <a:r>
-              <a:rPr lang="en-US" sz="2800" dirty="0" smtClean="0"/>
-              <a:t>maximum ship speed.</a:t>
-            </a:r>
-          </a:p>
-          <a:p>
-            <a:pPr eaLnBrk="1" hangingPunct="1">
-              <a:spcBef>
-                <a:spcPts val="1200"/>
-              </a:spcBef>
-              <a:spcAft>
-                <a:spcPts val="1200"/>
-              </a:spcAft>
-            </a:pPr>
-            <a:r>
-              <a:rPr lang="en-US" sz="2800" dirty="0" smtClean="0"/>
-              <a:t>Result MovementVector direction is calculated for the appropriate quadrant.</a:t>
-            </a:r>
-            <a:endParaRPr lang="en-US" sz="2000" dirty="0" smtClean="0"/>
-          </a:p>
-        </p:txBody>
-      </p:sp>
-      <p:grpSp>
-        <p:nvGrpSpPr>
-          <p:cNvPr id="60" name="Group 59"/>
-          <p:cNvGrpSpPr/>
-          <p:nvPr/>
-        </p:nvGrpSpPr>
-        <p:grpSpPr>
-          <a:xfrm>
-            <a:off x="28589922" y="24581127"/>
-            <a:ext cx="3022302" cy="3965249"/>
-            <a:chOff x="28742639" y="24640353"/>
-            <a:chExt cx="2841568" cy="3984561"/>
-          </a:xfrm>
-        </p:grpSpPr>
-        <p:cxnSp>
-          <p:nvCxnSpPr>
-            <p:cNvPr id="46" name="Elbow Connector 45"/>
-            <p:cNvCxnSpPr/>
-            <p:nvPr/>
-          </p:nvCxnSpPr>
-          <p:spPr bwMode="auto">
-            <a:xfrm rot="5400000">
-              <a:off x="27926138" y="25456854"/>
-              <a:ext cx="3984561" cy="2351560"/>
-            </a:xfrm>
-            <a:prstGeom prst="bentConnector3">
-              <a:avLst>
-                <a:gd name="adj1" fmla="val 100104"/>
-              </a:avLst>
-            </a:prstGeom>
-            <a:solidFill>
-              <a:schemeClr val="accent1"/>
-            </a:solidFill>
-            <a:ln w="9525" cap="flat" cmpd="sng" algn="ctr">
-              <a:solidFill>
-                <a:schemeClr val="tx1"/>
-              </a:solidFill>
-              <a:prstDash val="solid"/>
-              <a:round/>
-              <a:headEnd type="none" w="med" len="med"/>
-              <a:tailEnd type="arrow" w="med" len="med"/>
-            </a:ln>
-            <a:effectLst/>
-          </p:spPr>
-        </p:cxnSp>
-        <p:cxnSp>
-          <p:nvCxnSpPr>
-            <p:cNvPr id="49" name="Straight Connector 48"/>
-            <p:cNvCxnSpPr/>
-            <p:nvPr/>
-          </p:nvCxnSpPr>
-          <p:spPr bwMode="auto">
-            <a:xfrm>
-              <a:off x="31107711" y="24640353"/>
-              <a:ext cx="476496" cy="0"/>
-            </a:xfrm>
-            <a:prstGeom prst="line">
-              <a:avLst/>
-            </a:prstGeom>
-            <a:solidFill>
-              <a:schemeClr val="accent1"/>
-            </a:solidFill>
-            <a:ln w="9525" cap="flat" cmpd="sng" algn="ctr">
-              <a:solidFill>
-                <a:schemeClr val="tx1"/>
-              </a:solidFill>
-              <a:prstDash val="solid"/>
-              <a:round/>
-              <a:headEnd type="none" w="med" len="med"/>
-              <a:tailEnd type="none" w="med" len="med"/>
-            </a:ln>
-            <a:effectLst/>
-          </p:spPr>
-        </p:cxnSp>
-      </p:grpSp>
-      <p:cxnSp>
-        <p:nvCxnSpPr>
-          <p:cNvPr id="63" name="Elbow Connector 62"/>
-          <p:cNvCxnSpPr/>
-          <p:nvPr/>
-        </p:nvCxnSpPr>
-        <p:spPr bwMode="auto">
-          <a:xfrm rot="10800000" flipV="1">
-            <a:off x="26246024" y="23491171"/>
-            <a:ext cx="5408378" cy="2737825"/>
-          </a:xfrm>
-          <a:prstGeom prst="bentConnector3">
-            <a:avLst>
-              <a:gd name="adj1" fmla="val 18158"/>
-            </a:avLst>
-          </a:prstGeom>
-          <a:solidFill>
-            <a:schemeClr val="accent1"/>
-          </a:solidFill>
-          <a:ln w="9525" cap="flat" cmpd="sng" algn="ctr">
-            <a:solidFill>
-              <a:schemeClr val="tx1"/>
-            </a:solidFill>
-            <a:prstDash val="solid"/>
-            <a:round/>
-            <a:headEnd type="none" w="med" len="med"/>
-            <a:tailEnd type="triangle"/>
-          </a:ln>
-          <a:effectLst/>
-        </p:spPr>
-      </p:cxnSp>
-      <p:cxnSp>
-        <p:nvCxnSpPr>
-          <p:cNvPr id="69" name="Elbow Connector 68"/>
-          <p:cNvCxnSpPr/>
-          <p:nvPr/>
-        </p:nvCxnSpPr>
-        <p:spPr bwMode="auto">
-          <a:xfrm rot="10800000" flipV="1">
-            <a:off x="26639521" y="22723660"/>
-            <a:ext cx="4944689" cy="2540123"/>
-          </a:xfrm>
-          <a:prstGeom prst="bentConnector3">
-            <a:avLst>
-              <a:gd name="adj1" fmla="val 26576"/>
-            </a:avLst>
-          </a:prstGeom>
-          <a:solidFill>
-            <a:schemeClr val="accent1"/>
-          </a:solidFill>
-          <a:ln w="9525" cap="flat" cmpd="sng" algn="ctr">
-            <a:solidFill>
-              <a:schemeClr val="tx1"/>
-            </a:solidFill>
-            <a:prstDash val="solid"/>
-            <a:round/>
-            <a:headEnd type="none" w="med" len="med"/>
-            <a:tailEnd type="triangle"/>
-          </a:ln>
-          <a:effectLst/>
-        </p:spPr>
-      </p:cxnSp>
-      <p:pic>
-        <p:nvPicPr>
-          <p:cNvPr id="1026" name="Picture 2" descr="C:\Users\Gordon\Desktop\OriginalMotion.png"/>
-          <p:cNvPicPr>
-            <a:picLocks noChangeAspect="1" noChangeArrowheads="1"/>
-          </p:cNvPicPr>
-          <p:nvPr/>
-        </p:nvPicPr>
-        <p:blipFill>
-          <a:blip r:embed="rId13">
-            <a:extLst>
-              <a:ext uri="{28A0092B-C50C-407E-A947-70E740481C1C}">
-                <a14:useLocalDpi xmlns:a14="http://schemas.microsoft.com/office/drawing/2010/main" val="0"/>
-              </a:ext>
-            </a:extLst>
-          </a:blip>
-          <a:srcRect/>
-          <a:stretch>
-            <a:fillRect/>
-          </a:stretch>
-        </p:blipFill>
-        <p:spPr bwMode="auto">
-          <a:xfrm>
-            <a:off x="663752" y="25042071"/>
-            <a:ext cx="9803552" cy="7342632"/>
-          </a:xfrm>
-          <a:prstGeom prst="rect">
-            <a:avLst/>
-          </a:prstGeom>
-          <a:noFill/>
-          <a:extLst>
-            <a:ext uri="{909E8E84-426E-40DD-AFC4-6F175D3DCCD1}">
-              <a14:hiddenFill xmlns:a14="http://schemas.microsoft.com/office/drawing/2010/main">
-                <a:solidFill>
-                  <a:srgbClr val="FFFFFF"/>
-                </a:solidFill>
-              </a14:hiddenFill>
-            </a:ext>
-          </a:extLst>
-        </p:spPr>
-      </p:pic>
     </p:spTree>
   </p:cSld>
   <p:clrMapOvr>

</xml_diff>